<commit_message>
added backend part to presentation
</commit_message>
<xml_diff>
--- a/Daily/sprint7/Sprint7_Review.pptx
+++ b/Daily/sprint7/Sprint7_Review.pptx
@@ -5,7 +5,7 @@
     <p:sldMasterId id="2147483648" r:id="rId1"/>
   </p:sldMasterIdLst>
   <p:notesMasterIdLst>
-    <p:notesMasterId r:id="rId9"/>
+    <p:notesMasterId r:id="rId10"/>
   </p:notesMasterIdLst>
   <p:sldIdLst>
     <p:sldId id="256" r:id="rId2"/>
@@ -14,7 +14,8 @@
     <p:sldId id="268" r:id="rId5"/>
     <p:sldId id="261" r:id="rId6"/>
     <p:sldId id="269" r:id="rId7"/>
-    <p:sldId id="262" r:id="rId8"/>
+    <p:sldId id="270" r:id="rId8"/>
+    <p:sldId id="262" r:id="rId9"/>
   </p:sldIdLst>
   <p:sldSz cx="12192000" cy="6858000"/>
   <p:notesSz cx="6858000" cy="9144000"/>
@@ -125,12 +126,12 @@
 <p1510:revInfo xmlns:a="http://schemas.openxmlformats.org/drawingml/2006/main" xmlns:r="http://schemas.openxmlformats.org/officeDocument/2006/relationships" xmlns:p1510="http://schemas.microsoft.com/office/powerpoint/2015/10/main">
   <p1510:revLst>
     <p1510:client id="{20A3EE01-A5DE-4061-8792-411F3BD47289}" v="42" dt="2020-01-19T10:03:37.844"/>
-    <p1510:client id="{C631908C-1A98-4B70-95DA-3D04A3C60BBB}" v="171" dt="2020-01-21T12:32:07.929"/>
     <p1510:client id="{45FD4B75-A3FC-44CB-82E5-76D6F7DD7E3B}" v="375" dt="2020-01-19T13:46:40.518"/>
     <p1510:client id="{5343ECE3-9E46-444C-A3E7-13AED39F1A6F}" v="194" dt="2020-01-19T09:07:38.824"/>
     <p1510:client id="{6F85AB3B-9C26-4979-A8FD-2AB86F961360}" v="566" dt="2020-01-19T11:36:28.921"/>
+    <p1510:client id="{88307E76-9AA9-468C-AF85-650B13E9EA55}" v="12" dt="2020-01-19T09:35:01.725"/>
+    <p1510:client id="{C631908C-1A98-4B70-95DA-3D04A3C60BBB}" v="171" dt="2020-01-21T12:32:07.929"/>
     <p1510:client id="{FE7B93E8-EE30-4C20-B6B5-A7FAB8A0E614}" v="635" dt="2020-01-19T13:03:37.165"/>
-    <p1510:client id="{88307E76-9AA9-468C-AF85-650B13E9EA55}" v="12" dt="2020-01-19T09:35:01.725"/>
   </p1510:revLst>
 </p1510:revInfo>
 </file>
@@ -1005,7 +1006,7 @@
           <a:p>
             <a:fld id="{10D08ABD-147D-43D8-AD0E-C56070E2C69D}" type="slidenum">
               <a:rPr lang="de-DE" smtClean="0"/>
-              <a:t>‹Nr.›</a:t>
+              <a:t>‹#›</a:t>
             </a:fld>
             <a:endParaRPr lang="de-DE"/>
           </a:p>
@@ -1516,7 +1517,7 @@
           <a:p>
             <a:fld id="{9A48FC86-4651-46AF-9E4A-D3FC30E17613}" type="slidenum">
               <a:rPr lang="de-DE" smtClean="0"/>
-              <a:t>‹Nr.›</a:t>
+              <a:t>‹#›</a:t>
             </a:fld>
             <a:endParaRPr lang="de-DE"/>
           </a:p>
@@ -1722,7 +1723,7 @@
           <a:p>
             <a:fld id="{9A48FC86-4651-46AF-9E4A-D3FC30E17613}" type="slidenum">
               <a:rPr lang="de-DE" smtClean="0"/>
-              <a:t>‹Nr.›</a:t>
+              <a:t>‹#›</a:t>
             </a:fld>
             <a:endParaRPr lang="de-DE"/>
           </a:p>
@@ -1938,7 +1939,7 @@
           <a:p>
             <a:fld id="{9A48FC86-4651-46AF-9E4A-D3FC30E17613}" type="slidenum">
               <a:rPr lang="de-DE" smtClean="0"/>
-              <a:t>‹Nr.›</a:t>
+              <a:t>‹#›</a:t>
             </a:fld>
             <a:endParaRPr lang="de-DE"/>
           </a:p>
@@ -2144,7 +2145,7 @@
           <a:p>
             <a:fld id="{9A48FC86-4651-46AF-9E4A-D3FC30E17613}" type="slidenum">
               <a:rPr lang="de-DE" smtClean="0"/>
-              <a:t>‹Nr.›</a:t>
+              <a:t>‹#›</a:t>
             </a:fld>
             <a:endParaRPr lang="de-DE"/>
           </a:p>
@@ -2427,7 +2428,7 @@
           <a:p>
             <a:fld id="{9A48FC86-4651-46AF-9E4A-D3FC30E17613}" type="slidenum">
               <a:rPr lang="de-DE" smtClean="0"/>
-              <a:t>‹Nr.›</a:t>
+              <a:t>‹#›</a:t>
             </a:fld>
             <a:endParaRPr lang="de-DE"/>
           </a:p>
@@ -2700,7 +2701,7 @@
           <a:p>
             <a:fld id="{9A48FC86-4651-46AF-9E4A-D3FC30E17613}" type="slidenum">
               <a:rPr lang="de-DE" smtClean="0"/>
-              <a:t>‹Nr.›</a:t>
+              <a:t>‹#›</a:t>
             </a:fld>
             <a:endParaRPr lang="de-DE"/>
           </a:p>
@@ -3120,7 +3121,7 @@
           <a:p>
             <a:fld id="{9A48FC86-4651-46AF-9E4A-D3FC30E17613}" type="slidenum">
               <a:rPr lang="de-DE" smtClean="0"/>
-              <a:t>‹Nr.›</a:t>
+              <a:t>‹#›</a:t>
             </a:fld>
             <a:endParaRPr lang="de-DE"/>
           </a:p>
@@ -3269,7 +3270,7 @@
           <a:p>
             <a:fld id="{9A48FC86-4651-46AF-9E4A-D3FC30E17613}" type="slidenum">
               <a:rPr lang="de-DE" smtClean="0"/>
-              <a:t>‹Nr.›</a:t>
+              <a:t>‹#›</a:t>
             </a:fld>
             <a:endParaRPr lang="de-DE"/>
           </a:p>
@@ -3390,7 +3391,7 @@
           <a:p>
             <a:fld id="{9A48FC86-4651-46AF-9E4A-D3FC30E17613}" type="slidenum">
               <a:rPr lang="de-DE" smtClean="0"/>
-              <a:t>‹Nr.›</a:t>
+              <a:t>‹#›</a:t>
             </a:fld>
             <a:endParaRPr lang="de-DE"/>
           </a:p>
@@ -3709,7 +3710,7 @@
           <a:p>
             <a:fld id="{9A48FC86-4651-46AF-9E4A-D3FC30E17613}" type="slidenum">
               <a:rPr lang="de-DE" smtClean="0"/>
-              <a:t>‹Nr.›</a:t>
+              <a:t>‹#›</a:t>
             </a:fld>
             <a:endParaRPr lang="de-DE"/>
           </a:p>
@@ -4005,7 +4006,7 @@
           <a:p>
             <a:fld id="{9A48FC86-4651-46AF-9E4A-D3FC30E17613}" type="slidenum">
               <a:rPr lang="de-DE" smtClean="0"/>
-              <a:t>‹Nr.›</a:t>
+              <a:t>‹#›</a:t>
             </a:fld>
             <a:endParaRPr lang="de-DE"/>
           </a:p>
@@ -4318,7 +4319,7 @@
           <a:p>
             <a:fld id="{5999A4A4-2D96-49E3-B364-04D265390CD4}" type="slidenum">
               <a:rPr lang="de-DE" smtClean="0"/>
-              <a:t>‹Nr.›</a:t>
+              <a:t>‹#›</a:t>
             </a:fld>
             <a:endParaRPr lang="de-DE"/>
           </a:p>
@@ -4862,15 +4863,37 @@
             </a:pPr>
             <a:r>
               <a:rPr lang="en-US" dirty="0"/>
-              <a:t>Test Multi Target </a:t>
-            </a:r>
-            <a:r>
-              <a:rPr lang="en-US" dirty="0" err="1"/>
-              <a:t>Regressors</a:t>
-            </a:r>
+              <a:t>Test Multi Target Regressors (Scored Goals)</a:t>
+            </a:r>
+          </a:p>
+          <a:p>
+            <a:pPr marL="285750" indent="-285750">
+              <a:buClr>
+                <a:schemeClr val="accent1">
+                  <a:lumMod val="75000"/>
+                </a:schemeClr>
+              </a:buClr>
+              <a:buFont typeface="Arial" panose="020B0604020202020204" pitchFamily="34" charset="0"/>
+              <a:buChar char="▌"/>
+            </a:pPr>
             <a:r>
               <a:rPr lang="en-US" dirty="0"/>
-              <a:t> (Scored Goals)</a:t>
+              <a:t>10 Class Classification</a:t>
+            </a:r>
+          </a:p>
+          <a:p>
+            <a:pPr marL="285750" indent="-285750">
+              <a:buClr>
+                <a:schemeClr val="accent1">
+                  <a:lumMod val="75000"/>
+                </a:schemeClr>
+              </a:buClr>
+              <a:buFont typeface="Arial" panose="020B0604020202020204" pitchFamily="34" charset="0"/>
+              <a:buChar char="▌"/>
+            </a:pPr>
+            <a:r>
+              <a:rPr lang="en-US" dirty="0"/>
+              <a:t>Backend</a:t>
             </a:r>
           </a:p>
           <a:p>
@@ -5968,7 +5991,13 @@
       </p:grpSpPr>
       <p:sp>
         <p:nvSpPr>
-          <p:cNvPr id="2" name="Titre 1"/>
+          <p:cNvPr id="2" name="Title 1">
+            <a:extLst>
+              <a:ext uri="{FF2B5EF4-FFF2-40B4-BE49-F238E27FC236}">
+                <a16:creationId xmlns:a16="http://schemas.microsoft.com/office/drawing/2014/main" id="{78FF315A-47E9-457D-A1D3-F6FD5400691F}"/>
+              </a:ext>
+            </a:extLst>
+          </p:cNvPr>
           <p:cNvSpPr>
             <a:spLocks noGrp="1"/>
           </p:cNvSpPr>
@@ -5983,14 +6012,21 @@
           <a:p>
             <a:r>
               <a:rPr lang="en-US" b="1" dirty="0"/>
-              <a:t>Next Sprint</a:t>
-            </a:r>
-          </a:p>
-        </p:txBody>
-      </p:sp>
-      <p:sp>
-        <p:nvSpPr>
-          <p:cNvPr id="3" name="Espace réservé du contenu 2"/>
+              <a:t>Backend</a:t>
+            </a:r>
+            <a:endParaRPr lang="en-DE" b="1" dirty="0"/>
+          </a:p>
+        </p:txBody>
+      </p:sp>
+      <p:sp>
+        <p:nvSpPr>
+          <p:cNvPr id="3" name="Content Placeholder 2">
+            <a:extLst>
+              <a:ext uri="{FF2B5EF4-FFF2-40B4-BE49-F238E27FC236}">
+                <a16:creationId xmlns:a16="http://schemas.microsoft.com/office/drawing/2014/main" id="{B865C100-3E5D-487D-9B0F-CE8617A262B1}"/>
+              </a:ext>
+            </a:extLst>
+          </p:cNvPr>
           <p:cNvSpPr>
             <a:spLocks noGrp="1"/>
           </p:cNvSpPr>
@@ -6014,7 +6050,7 @@
             </a:pPr>
             <a:r>
               <a:rPr lang="en-US" dirty="0"/>
-              <a:t>Regression: Improve models</a:t>
+              <a:t>Model integration finished</a:t>
             </a:r>
           </a:p>
           <a:p>
@@ -6029,7 +6065,158 @@
             </a:pPr>
             <a:r>
               <a:rPr lang="en-US" dirty="0"/>
-              <a:t>Backend</a:t>
+              <a:t>Database research, for </a:t>
+            </a:r>
+            <a:r>
+              <a:rPr lang="en-US" dirty="0" err="1"/>
+              <a:t>realtime</a:t>
+            </a:r>
+            <a:r>
+              <a:rPr lang="en-US" dirty="0"/>
+              <a:t> predictions</a:t>
+            </a:r>
+          </a:p>
+          <a:p>
+            <a:pPr marL="285750" indent="-285750">
+              <a:buClr>
+                <a:schemeClr val="accent1">
+                  <a:lumMod val="75000"/>
+                </a:schemeClr>
+              </a:buClr>
+              <a:buFont typeface="Arial" panose="020B0604020202020204" pitchFamily="34" charset="0"/>
+              <a:buChar char="▌"/>
+            </a:pPr>
+            <a:endParaRPr lang="en-US" dirty="0"/>
+          </a:p>
+        </p:txBody>
+      </p:sp>
+      <p:sp>
+        <p:nvSpPr>
+          <p:cNvPr id="4" name="Footer Placeholder 3">
+            <a:extLst>
+              <a:ext uri="{FF2B5EF4-FFF2-40B4-BE49-F238E27FC236}">
+                <a16:creationId xmlns:a16="http://schemas.microsoft.com/office/drawing/2014/main" id="{8654EC66-7C5F-455B-A0AF-EA98B28DA34D}"/>
+              </a:ext>
+            </a:extLst>
+          </p:cNvPr>
+          <p:cNvSpPr>
+            <a:spLocks noGrp="1"/>
+          </p:cNvSpPr>
+          <p:nvPr>
+            <p:ph type="ftr" sz="quarter" idx="11"/>
+          </p:nvPr>
+        </p:nvSpPr>
+        <p:spPr/>
+        <p:txBody>
+          <a:bodyPr/>
+          <a:lstStyle/>
+          <a:p>
+            <a:endParaRPr lang="de-DE" dirty="0"/>
+          </a:p>
+        </p:txBody>
+      </p:sp>
+    </p:spTree>
+    <p:extLst>
+      <p:ext uri="{BB962C8B-B14F-4D97-AF65-F5344CB8AC3E}">
+        <p14:creationId xmlns:p14="http://schemas.microsoft.com/office/powerpoint/2010/main" val="1342361698"/>
+      </p:ext>
+    </p:extLst>
+  </p:cSld>
+  <p:clrMapOvr>
+    <a:masterClrMapping/>
+  </p:clrMapOvr>
+</p:sld>
+</file>
+
+<file path=ppt/slides/slide8.xml><?xml version="1.0" encoding="utf-8"?>
+<p:sld xmlns:a="http://schemas.openxmlformats.org/drawingml/2006/main" xmlns:r="http://schemas.openxmlformats.org/officeDocument/2006/relationships" xmlns:p="http://schemas.openxmlformats.org/presentationml/2006/main">
+  <p:cSld>
+    <p:spTree>
+      <p:nvGrpSpPr>
+        <p:cNvPr id="1" name=""/>
+        <p:cNvGrpSpPr/>
+        <p:nvPr/>
+      </p:nvGrpSpPr>
+      <p:grpSpPr>
+        <a:xfrm>
+          <a:off x="0" y="0"/>
+          <a:ext cx="0" cy="0"/>
+          <a:chOff x="0" y="0"/>
+          <a:chExt cx="0" cy="0"/>
+        </a:xfrm>
+      </p:grpSpPr>
+      <p:sp>
+        <p:nvSpPr>
+          <p:cNvPr id="2" name="Titre 1"/>
+          <p:cNvSpPr>
+            <a:spLocks noGrp="1"/>
+          </p:cNvSpPr>
+          <p:nvPr>
+            <p:ph type="title"/>
+          </p:nvPr>
+        </p:nvSpPr>
+        <p:spPr/>
+        <p:txBody>
+          <a:bodyPr/>
+          <a:lstStyle/>
+          <a:p>
+            <a:r>
+              <a:rPr lang="en-US" b="1" dirty="0"/>
+              <a:t>Next Sprint</a:t>
+            </a:r>
+          </a:p>
+        </p:txBody>
+      </p:sp>
+      <p:sp>
+        <p:nvSpPr>
+          <p:cNvPr id="3" name="Espace réservé du contenu 2"/>
+          <p:cNvSpPr>
+            <a:spLocks noGrp="1"/>
+          </p:cNvSpPr>
+          <p:nvPr>
+            <p:ph idx="1"/>
+          </p:nvPr>
+        </p:nvSpPr>
+        <p:spPr/>
+        <p:txBody>
+          <a:bodyPr/>
+          <a:lstStyle/>
+          <a:p>
+            <a:pPr marL="285750" indent="-285750">
+              <a:buClr>
+                <a:schemeClr val="accent1">
+                  <a:lumMod val="75000"/>
+                </a:schemeClr>
+              </a:buClr>
+              <a:buFont typeface="Arial" panose="020B0604020202020204" pitchFamily="34" charset="0"/>
+              <a:buChar char="▌"/>
+            </a:pPr>
+            <a:r>
+              <a:rPr lang="en-US" dirty="0"/>
+              <a:t>Regression: Improve models</a:t>
+            </a:r>
+          </a:p>
+          <a:p>
+            <a:pPr marL="285750" indent="-285750">
+              <a:buClr>
+                <a:schemeClr val="accent1">
+                  <a:lumMod val="75000"/>
+                </a:schemeClr>
+              </a:buClr>
+              <a:buFont typeface="Arial" panose="020B0604020202020204" pitchFamily="34" charset="0"/>
+              <a:buChar char="▌"/>
+            </a:pPr>
+            <a:r>
+              <a:rPr lang="en-US" dirty="0"/>
+              <a:t>Backend: Database integration, fetch </a:t>
+            </a:r>
+            <a:r>
+              <a:rPr lang="en-US" dirty="0" err="1"/>
+              <a:t>realtime</a:t>
+            </a:r>
+            <a:r>
+              <a:rPr lang="en-US" dirty="0"/>
+              <a:t> data</a:t>
             </a:r>
           </a:p>
           <a:p>

</xml_diff>